<commit_message>
Updates to presentation materials;
</commit_message>
<xml_diff>
--- a/Planning/Virtual Velocity.pptx
+++ b/Planning/Virtual Velocity.pptx
@@ -14,9 +14,8 @@
     <p:sldId id="262" r:id="rId8"/>
     <p:sldId id="261" r:id="rId9"/>
     <p:sldId id="263" r:id="rId10"/>
-    <p:sldId id="264" r:id="rId11"/>
-    <p:sldId id="265" r:id="rId12"/>
-    <p:sldId id="266" r:id="rId13"/>
+    <p:sldId id="266" r:id="rId11"/>
+    <p:sldId id="268" r:id="rId12"/>
   </p:sldIdLst>
   <p:sldSz cx="12192000" cy="6858000"/>
   <p:notesSz cx="6858000" cy="9144000"/>
@@ -115,6 +114,11 @@
       </a:defRPr>
     </a:lvl9pPr>
   </p:defaultTextStyle>
+  <p:extLst>
+    <p:ext uri="{EFAFB233-063F-42B5-8137-9DF3F51BA10A}">
+      <p15:sldGuideLst xmlns:p15="http://schemas.microsoft.com/office/powerpoint/2012/main"/>
+    </p:ext>
+  </p:extLst>
 </p:presentation>
 </file>
 
@@ -175,7 +179,7 @@
           <a:noFill/>
           <a:extLst>
             <a:ext uri="{909E8E84-426E-40dd-AFC4-6F175D3DCCD1}">
-              <a14:hiddenFill xmlns:a14="http://schemas.microsoft.com/office/drawing/2010/main" xmlns="">
+              <a14:hiddenFill xmlns="" xmlns:a14="http://schemas.microsoft.com/office/drawing/2010/main">
                 <a:solidFill>
                   <a:srgbClr val="FFFFFF"/>
                 </a:solidFill>
@@ -234,7 +238,7 @@
             </a:ln>
             <a:extLst>
               <a:ext uri="{91240B29-F687-4f45-9708-019B960494DF}">
-                <a14:hiddenLine xmlns:a14="http://schemas.microsoft.com/office/drawing/2010/main" xmlns="" w="9525">
+                <a14:hiddenLine xmlns="" xmlns:a14="http://schemas.microsoft.com/office/drawing/2010/main" w="9525">
                   <a:solidFill>
                     <a:srgbClr val="000000"/>
                   </a:solidFill>
@@ -324,7 +328,7 @@
             </a:ln>
             <a:extLst>
               <a:ext uri="{91240B29-F687-4f45-9708-019B960494DF}">
-                <a14:hiddenLine xmlns:a14="http://schemas.microsoft.com/office/drawing/2010/main" xmlns="" w="9525">
+                <a14:hiddenLine xmlns="" xmlns:a14="http://schemas.microsoft.com/office/drawing/2010/main" w="9525">
                   <a:solidFill>
                     <a:srgbClr val="000000"/>
                   </a:solidFill>
@@ -414,7 +418,7 @@
             </a:ln>
             <a:extLst>
               <a:ext uri="{91240B29-F687-4f45-9708-019B960494DF}">
-                <a14:hiddenLine xmlns:a14="http://schemas.microsoft.com/office/drawing/2010/main" xmlns="" w="9525">
+                <a14:hiddenLine xmlns="" xmlns:a14="http://schemas.microsoft.com/office/drawing/2010/main" w="9525">
                   <a:solidFill>
                     <a:srgbClr val="000000"/>
                   </a:solidFill>
@@ -448,7 +452,7 @@
             </a:ln>
             <a:extLst>
               <a:ext uri="{91240B29-F687-4f45-9708-019B960494DF}">
-                <a14:hiddenLine xmlns:a14="http://schemas.microsoft.com/office/drawing/2010/main" xmlns="" w="9525">
+                <a14:hiddenLine xmlns="" xmlns:a14="http://schemas.microsoft.com/office/drawing/2010/main" w="9525">
                   <a:solidFill>
                     <a:srgbClr val="000000"/>
                   </a:solidFill>
@@ -538,7 +542,7 @@
             </a:ln>
             <a:extLst>
               <a:ext uri="{91240B29-F687-4f45-9708-019B960494DF}">
-                <a14:hiddenLine xmlns:a14="http://schemas.microsoft.com/office/drawing/2010/main" xmlns="" w="9525">
+                <a14:hiddenLine xmlns="" xmlns:a14="http://schemas.microsoft.com/office/drawing/2010/main" w="9525">
                   <a:solidFill>
                     <a:srgbClr val="000000"/>
                   </a:solidFill>
@@ -600,7 +604,7 @@
             </a:ln>
             <a:extLst>
               <a:ext uri="{91240B29-F687-4f45-9708-019B960494DF}">
-                <a14:hiddenLine xmlns:a14="http://schemas.microsoft.com/office/drawing/2010/main" xmlns="" w="9525">
+                <a14:hiddenLine xmlns="" xmlns:a14="http://schemas.microsoft.com/office/drawing/2010/main" w="9525">
                   <a:solidFill>
                     <a:srgbClr val="000000"/>
                   </a:solidFill>
@@ -662,7 +666,7 @@
             </a:ln>
             <a:extLst>
               <a:ext uri="{91240B29-F687-4f45-9708-019B960494DF}">
-                <a14:hiddenLine xmlns:a14="http://schemas.microsoft.com/office/drawing/2010/main" xmlns="" w="9525">
+                <a14:hiddenLine xmlns="" xmlns:a14="http://schemas.microsoft.com/office/drawing/2010/main" w="9525">
                   <a:solidFill>
                     <a:srgbClr val="000000"/>
                   </a:solidFill>
@@ -752,7 +756,7 @@
             </a:ln>
             <a:extLst>
               <a:ext uri="{91240B29-F687-4f45-9708-019B960494DF}">
-                <a14:hiddenLine xmlns:a14="http://schemas.microsoft.com/office/drawing/2010/main" xmlns="" w="9525">
+                <a14:hiddenLine xmlns="" xmlns:a14="http://schemas.microsoft.com/office/drawing/2010/main" w="9525">
                   <a:solidFill>
                     <a:srgbClr val="000000"/>
                   </a:solidFill>
@@ -814,7 +818,7 @@
             </a:ln>
             <a:extLst>
               <a:ext uri="{91240B29-F687-4f45-9708-019B960494DF}">
-                <a14:hiddenLine xmlns:a14="http://schemas.microsoft.com/office/drawing/2010/main" xmlns="" w="9525">
+                <a14:hiddenLine xmlns="" xmlns:a14="http://schemas.microsoft.com/office/drawing/2010/main" w="9525">
                   <a:solidFill>
                     <a:srgbClr val="000000"/>
                   </a:solidFill>
@@ -876,7 +880,7 @@
             </a:ln>
             <a:extLst>
               <a:ext uri="{91240B29-F687-4f45-9708-019B960494DF}">
-                <a14:hiddenLine xmlns:a14="http://schemas.microsoft.com/office/drawing/2010/main" xmlns="" w="9525">
+                <a14:hiddenLine xmlns="" xmlns:a14="http://schemas.microsoft.com/office/drawing/2010/main" w="9525">
                   <a:solidFill>
                     <a:srgbClr val="000000"/>
                   </a:solidFill>
@@ -966,7 +970,7 @@
             </a:ln>
             <a:extLst>
               <a:ext uri="{91240B29-F687-4f45-9708-019B960494DF}">
-                <a14:hiddenLine xmlns:a14="http://schemas.microsoft.com/office/drawing/2010/main" xmlns="" w="9525">
+                <a14:hiddenLine xmlns="" xmlns:a14="http://schemas.microsoft.com/office/drawing/2010/main" w="9525">
                   <a:solidFill>
                     <a:srgbClr val="000000"/>
                   </a:solidFill>
@@ -1056,7 +1060,7 @@
             </a:ln>
             <a:extLst>
               <a:ext uri="{91240B29-F687-4f45-9708-019B960494DF}">
-                <a14:hiddenLine xmlns:a14="http://schemas.microsoft.com/office/drawing/2010/main" xmlns="" w="9525">
+                <a14:hiddenLine xmlns="" xmlns:a14="http://schemas.microsoft.com/office/drawing/2010/main" w="9525">
                   <a:solidFill>
                     <a:srgbClr val="000000"/>
                   </a:solidFill>
@@ -1118,7 +1122,7 @@
             </a:ln>
             <a:extLst>
               <a:ext uri="{91240B29-F687-4f45-9708-019B960494DF}">
-                <a14:hiddenLine xmlns:a14="http://schemas.microsoft.com/office/drawing/2010/main" xmlns="" w="9525">
+                <a14:hiddenLine xmlns="" xmlns:a14="http://schemas.microsoft.com/office/drawing/2010/main" w="9525">
                   <a:solidFill>
                     <a:srgbClr val="000000"/>
                   </a:solidFill>
@@ -1228,7 +1232,7 @@
             </a:ln>
             <a:extLst>
               <a:ext uri="{91240B29-F687-4f45-9708-019B960494DF}">
-                <a14:hiddenLine xmlns:a14="http://schemas.microsoft.com/office/drawing/2010/main" xmlns="" w="9525">
+                <a14:hiddenLine xmlns="" xmlns:a14="http://schemas.microsoft.com/office/drawing/2010/main" w="9525">
                   <a:solidFill>
                     <a:srgbClr val="000000"/>
                   </a:solidFill>
@@ -1290,7 +1294,7 @@
             </a:ln>
             <a:extLst>
               <a:ext uri="{91240B29-F687-4f45-9708-019B960494DF}">
-                <a14:hiddenLine xmlns:a14="http://schemas.microsoft.com/office/drawing/2010/main" xmlns="" w="9525">
+                <a14:hiddenLine xmlns="" xmlns:a14="http://schemas.microsoft.com/office/drawing/2010/main" w="9525">
                   <a:solidFill>
                     <a:srgbClr val="000000"/>
                   </a:solidFill>
@@ -1380,7 +1384,7 @@
             </a:ln>
             <a:extLst>
               <a:ext uri="{91240B29-F687-4f45-9708-019B960494DF}">
-                <a14:hiddenLine xmlns:a14="http://schemas.microsoft.com/office/drawing/2010/main" xmlns="" w="9525">
+                <a14:hiddenLine xmlns="" xmlns:a14="http://schemas.microsoft.com/office/drawing/2010/main" w="9525">
                   <a:solidFill>
                     <a:srgbClr val="000000"/>
                   </a:solidFill>
@@ -1470,7 +1474,7 @@
             </a:ln>
             <a:extLst>
               <a:ext uri="{91240B29-F687-4f45-9708-019B960494DF}">
-                <a14:hiddenLine xmlns:a14="http://schemas.microsoft.com/office/drawing/2010/main" xmlns="" w="9525">
+                <a14:hiddenLine xmlns="" xmlns:a14="http://schemas.microsoft.com/office/drawing/2010/main" w="9525">
                   <a:solidFill>
                     <a:srgbClr val="000000"/>
                   </a:solidFill>
@@ -1532,7 +1536,7 @@
             </a:ln>
             <a:extLst>
               <a:ext uri="{91240B29-F687-4f45-9708-019B960494DF}">
-                <a14:hiddenLine xmlns:a14="http://schemas.microsoft.com/office/drawing/2010/main" xmlns="" w="9525">
+                <a14:hiddenLine xmlns="" xmlns:a14="http://schemas.microsoft.com/office/drawing/2010/main" w="9525">
                   <a:solidFill>
                     <a:srgbClr val="000000"/>
                   </a:solidFill>
@@ -1622,7 +1626,7 @@
             </a:ln>
             <a:extLst>
               <a:ext uri="{91240B29-F687-4f45-9708-019B960494DF}">
-                <a14:hiddenLine xmlns:a14="http://schemas.microsoft.com/office/drawing/2010/main" xmlns="" w="9525">
+                <a14:hiddenLine xmlns="" xmlns:a14="http://schemas.microsoft.com/office/drawing/2010/main" w="9525">
                   <a:solidFill>
                     <a:srgbClr val="000000"/>
                   </a:solidFill>
@@ -1712,7 +1716,7 @@
             </a:ln>
             <a:extLst>
               <a:ext uri="{91240B29-F687-4f45-9708-019B960494DF}">
-                <a14:hiddenLine xmlns:a14="http://schemas.microsoft.com/office/drawing/2010/main" xmlns="" w="9525">
+                <a14:hiddenLine xmlns="" xmlns:a14="http://schemas.microsoft.com/office/drawing/2010/main" w="9525">
                   <a:solidFill>
                     <a:srgbClr val="000000"/>
                   </a:solidFill>
@@ -1768,7 +1772,7 @@
             </a:ln>
             <a:extLst>
               <a:ext uri="{91240B29-F687-4f45-9708-019B960494DF}">
-                <a14:hiddenLine xmlns:a14="http://schemas.microsoft.com/office/drawing/2010/main" xmlns="" w="9525">
+                <a14:hiddenLine xmlns="" xmlns:a14="http://schemas.microsoft.com/office/drawing/2010/main" w="9525">
                   <a:solidFill>
                     <a:srgbClr val="000000"/>
                   </a:solidFill>
@@ -1858,7 +1862,7 @@
             </a:ln>
             <a:extLst>
               <a:ext uri="{91240B29-F687-4f45-9708-019B960494DF}">
-                <a14:hiddenLine xmlns:a14="http://schemas.microsoft.com/office/drawing/2010/main" xmlns="" w="9525">
+                <a14:hiddenLine xmlns="" xmlns:a14="http://schemas.microsoft.com/office/drawing/2010/main" w="9525">
                   <a:solidFill>
                     <a:srgbClr val="000000"/>
                   </a:solidFill>
@@ -1914,7 +1918,7 @@
             </a:ln>
             <a:extLst>
               <a:ext uri="{91240B29-F687-4f45-9708-019B960494DF}">
-                <a14:hiddenLine xmlns:a14="http://schemas.microsoft.com/office/drawing/2010/main" xmlns="" w="9525">
+                <a14:hiddenLine xmlns="" xmlns:a14="http://schemas.microsoft.com/office/drawing/2010/main" w="9525">
                   <a:solidFill>
                     <a:srgbClr val="000000"/>
                   </a:solidFill>
@@ -2004,7 +2008,7 @@
             </a:ln>
             <a:extLst>
               <a:ext uri="{91240B29-F687-4f45-9708-019B960494DF}">
-                <a14:hiddenLine xmlns:a14="http://schemas.microsoft.com/office/drawing/2010/main" xmlns="" w="9525">
+                <a14:hiddenLine xmlns="" xmlns:a14="http://schemas.microsoft.com/office/drawing/2010/main" w="9525">
                   <a:solidFill>
                     <a:srgbClr val="000000"/>
                   </a:solidFill>
@@ -2072,7 +2076,7 @@
             </a:ln>
             <a:extLst>
               <a:ext uri="{91240B29-F687-4f45-9708-019B960494DF}">
-                <a14:hiddenLine xmlns:a14="http://schemas.microsoft.com/office/drawing/2010/main" xmlns="" w="9525">
+                <a14:hiddenLine xmlns="" xmlns:a14="http://schemas.microsoft.com/office/drawing/2010/main" w="9525">
                   <a:solidFill>
                     <a:srgbClr val="000000"/>
                   </a:solidFill>
@@ -2162,7 +2166,7 @@
             </a:ln>
             <a:extLst>
               <a:ext uri="{91240B29-F687-4f45-9708-019B960494DF}">
-                <a14:hiddenLine xmlns:a14="http://schemas.microsoft.com/office/drawing/2010/main" xmlns="" w="9525">
+                <a14:hiddenLine xmlns="" xmlns:a14="http://schemas.microsoft.com/office/drawing/2010/main" w="9525">
                   <a:solidFill>
                     <a:srgbClr val="000000"/>
                   </a:solidFill>
@@ -2230,7 +2234,7 @@
             </a:ln>
             <a:extLst>
               <a:ext uri="{91240B29-F687-4f45-9708-019B960494DF}">
-                <a14:hiddenLine xmlns:a14="http://schemas.microsoft.com/office/drawing/2010/main" xmlns="" w="9525">
+                <a14:hiddenLine xmlns="" xmlns:a14="http://schemas.microsoft.com/office/drawing/2010/main" w="9525">
                   <a:solidFill>
                     <a:srgbClr val="000000"/>
                   </a:solidFill>
@@ -2320,7 +2324,7 @@
             </a:ln>
             <a:extLst>
               <a:ext uri="{91240B29-F687-4f45-9708-019B960494DF}">
-                <a14:hiddenLine xmlns:a14="http://schemas.microsoft.com/office/drawing/2010/main" xmlns="" w="9525">
+                <a14:hiddenLine xmlns="" xmlns:a14="http://schemas.microsoft.com/office/drawing/2010/main" w="9525">
                   <a:solidFill>
                     <a:srgbClr val="000000"/>
                   </a:solidFill>
@@ -2354,7 +2358,7 @@
             </a:ln>
             <a:extLst>
               <a:ext uri="{91240B29-F687-4f45-9708-019B960494DF}">
-                <a14:hiddenLine xmlns:a14="http://schemas.microsoft.com/office/drawing/2010/main" xmlns="" w="9525">
+                <a14:hiddenLine xmlns="" xmlns:a14="http://schemas.microsoft.com/office/drawing/2010/main" w="9525">
                   <a:solidFill>
                     <a:srgbClr val="000000"/>
                   </a:solidFill>
@@ -2444,7 +2448,7 @@
             </a:ln>
             <a:extLst>
               <a:ext uri="{91240B29-F687-4f45-9708-019B960494DF}">
-                <a14:hiddenLine xmlns:a14="http://schemas.microsoft.com/office/drawing/2010/main" xmlns="" w="9525">
+                <a14:hiddenLine xmlns="" xmlns:a14="http://schemas.microsoft.com/office/drawing/2010/main" w="9525">
                   <a:solidFill>
                     <a:srgbClr val="000000"/>
                   </a:solidFill>
@@ -2506,7 +2510,7 @@
             </a:ln>
             <a:extLst>
               <a:ext uri="{91240B29-F687-4f45-9708-019B960494DF}">
-                <a14:hiddenLine xmlns:a14="http://schemas.microsoft.com/office/drawing/2010/main" xmlns="" w="9525">
+                <a14:hiddenLine xmlns="" xmlns:a14="http://schemas.microsoft.com/office/drawing/2010/main" w="9525">
                   <a:solidFill>
                     <a:srgbClr val="000000"/>
                   </a:solidFill>
@@ -2568,7 +2572,7 @@
             </a:ln>
             <a:extLst>
               <a:ext uri="{91240B29-F687-4f45-9708-019B960494DF}">
-                <a14:hiddenLine xmlns:a14="http://schemas.microsoft.com/office/drawing/2010/main" xmlns="" w="9525">
+                <a14:hiddenLine xmlns="" xmlns:a14="http://schemas.microsoft.com/office/drawing/2010/main" w="9525">
                   <a:solidFill>
                     <a:srgbClr val="000000"/>
                   </a:solidFill>
@@ -2658,7 +2662,7 @@
             </a:ln>
             <a:extLst>
               <a:ext uri="{91240B29-F687-4f45-9708-019B960494DF}">
-                <a14:hiddenLine xmlns:a14="http://schemas.microsoft.com/office/drawing/2010/main" xmlns="" w="9525">
+                <a14:hiddenLine xmlns="" xmlns:a14="http://schemas.microsoft.com/office/drawing/2010/main" w="9525">
                   <a:solidFill>
                     <a:srgbClr val="000000"/>
                   </a:solidFill>
@@ -2726,7 +2730,7 @@
             </a:ln>
             <a:extLst>
               <a:ext uri="{91240B29-F687-4f45-9708-019B960494DF}">
-                <a14:hiddenLine xmlns:a14="http://schemas.microsoft.com/office/drawing/2010/main" xmlns="" w="9525">
+                <a14:hiddenLine xmlns="" xmlns:a14="http://schemas.microsoft.com/office/drawing/2010/main" w="9525">
                   <a:solidFill>
                     <a:srgbClr val="000000"/>
                   </a:solidFill>
@@ -2788,7 +2792,7 @@
             </a:ln>
             <a:extLst>
               <a:ext uri="{91240B29-F687-4f45-9708-019B960494DF}">
-                <a14:hiddenLine xmlns:a14="http://schemas.microsoft.com/office/drawing/2010/main" xmlns="" w="9525">
+                <a14:hiddenLine xmlns="" xmlns:a14="http://schemas.microsoft.com/office/drawing/2010/main" w="9525">
                   <a:solidFill>
                     <a:srgbClr val="000000"/>
                   </a:solidFill>
@@ -2878,7 +2882,7 @@
             </a:ln>
             <a:extLst>
               <a:ext uri="{91240B29-F687-4f45-9708-019B960494DF}">
-                <a14:hiddenLine xmlns:a14="http://schemas.microsoft.com/office/drawing/2010/main" xmlns="" w="9525">
+                <a14:hiddenLine xmlns="" xmlns:a14="http://schemas.microsoft.com/office/drawing/2010/main" w="9525">
                   <a:solidFill>
                     <a:srgbClr val="000000"/>
                   </a:solidFill>
@@ -2940,7 +2944,7 @@
             </a:ln>
             <a:extLst>
               <a:ext uri="{91240B29-F687-4f45-9708-019B960494DF}">
-                <a14:hiddenLine xmlns:a14="http://schemas.microsoft.com/office/drawing/2010/main" xmlns="" w="9525">
+                <a14:hiddenLine xmlns="" xmlns:a14="http://schemas.microsoft.com/office/drawing/2010/main" w="9525">
                   <a:solidFill>
                     <a:srgbClr val="000000"/>
                   </a:solidFill>
@@ -3030,7 +3034,7 @@
             </a:ln>
             <a:extLst>
               <a:ext uri="{91240B29-F687-4f45-9708-019B960494DF}">
-                <a14:hiddenLine xmlns:a14="http://schemas.microsoft.com/office/drawing/2010/main" xmlns="" w="9525">
+                <a14:hiddenLine xmlns="" xmlns:a14="http://schemas.microsoft.com/office/drawing/2010/main" w="9525">
                   <a:solidFill>
                     <a:srgbClr val="000000"/>
                   </a:solidFill>
@@ -3092,7 +3096,7 @@
             </a:ln>
             <a:extLst>
               <a:ext uri="{91240B29-F687-4f45-9708-019B960494DF}">
-                <a14:hiddenLine xmlns:a14="http://schemas.microsoft.com/office/drawing/2010/main" xmlns="" w="9525">
+                <a14:hiddenLine xmlns="" xmlns:a14="http://schemas.microsoft.com/office/drawing/2010/main" w="9525">
                   <a:solidFill>
                     <a:srgbClr val="000000"/>
                   </a:solidFill>
@@ -3182,7 +3186,7 @@
             </a:ln>
             <a:extLst>
               <a:ext uri="{91240B29-F687-4f45-9708-019B960494DF}">
-                <a14:hiddenLine xmlns:a14="http://schemas.microsoft.com/office/drawing/2010/main" xmlns="" w="9525">
+                <a14:hiddenLine xmlns="" xmlns:a14="http://schemas.microsoft.com/office/drawing/2010/main" w="9525">
                   <a:solidFill>
                     <a:srgbClr val="000000"/>
                   </a:solidFill>
@@ -3216,7 +3220,7 @@
             </a:ln>
             <a:extLst>
               <a:ext uri="{91240B29-F687-4f45-9708-019B960494DF}">
-                <a14:hiddenLine xmlns:a14="http://schemas.microsoft.com/office/drawing/2010/main" xmlns="" w="9525">
+                <a14:hiddenLine xmlns="" xmlns:a14="http://schemas.microsoft.com/office/drawing/2010/main" w="9525">
                   <a:solidFill>
                     <a:srgbClr val="000000"/>
                   </a:solidFill>
@@ -3281,7 +3285,7 @@
             </a:ln>
             <a:extLst>
               <a:ext uri="{91240B29-F687-4f45-9708-019B960494DF}">
-                <a14:hiddenLine xmlns:a14="http://schemas.microsoft.com/office/drawing/2010/main" xmlns="" w="9525">
+                <a14:hiddenLine xmlns="" xmlns:a14="http://schemas.microsoft.com/office/drawing/2010/main" w="9525">
                   <a:solidFill>
                     <a:srgbClr val="000000"/>
                   </a:solidFill>
@@ -3371,7 +3375,7 @@
             </a:ln>
             <a:extLst>
               <a:ext uri="{91240B29-F687-4f45-9708-019B960494DF}">
-                <a14:hiddenLine xmlns:a14="http://schemas.microsoft.com/office/drawing/2010/main" xmlns="" w="9525">
+                <a14:hiddenLine xmlns="" xmlns:a14="http://schemas.microsoft.com/office/drawing/2010/main" w="9525">
                   <a:solidFill>
                     <a:srgbClr val="000000"/>
                   </a:solidFill>
@@ -3433,7 +3437,7 @@
             </a:ln>
             <a:extLst>
               <a:ext uri="{91240B29-F687-4f45-9708-019B960494DF}">
-                <a14:hiddenLine xmlns:a14="http://schemas.microsoft.com/office/drawing/2010/main" xmlns="" w="9525">
+                <a14:hiddenLine xmlns="" xmlns:a14="http://schemas.microsoft.com/office/drawing/2010/main" w="9525">
                   <a:solidFill>
                     <a:srgbClr val="000000"/>
                   </a:solidFill>
@@ -3523,7 +3527,7 @@
             </a:ln>
             <a:extLst>
               <a:ext uri="{91240B29-F687-4f45-9708-019B960494DF}">
-                <a14:hiddenLine xmlns:a14="http://schemas.microsoft.com/office/drawing/2010/main" xmlns="" w="9525">
+                <a14:hiddenLine xmlns="" xmlns:a14="http://schemas.microsoft.com/office/drawing/2010/main" w="9525">
                   <a:solidFill>
                     <a:srgbClr val="000000"/>
                   </a:solidFill>
@@ -3613,7 +3617,7 @@
             </a:ln>
             <a:extLst>
               <a:ext uri="{91240B29-F687-4f45-9708-019B960494DF}">
-                <a14:hiddenLine xmlns:a14="http://schemas.microsoft.com/office/drawing/2010/main" xmlns="" w="9525">
+                <a14:hiddenLine xmlns="" xmlns:a14="http://schemas.microsoft.com/office/drawing/2010/main" w="9525">
                   <a:solidFill>
                     <a:srgbClr val="000000"/>
                   </a:solidFill>
@@ -3678,7 +3682,7 @@
             </a:ln>
             <a:extLst>
               <a:ext uri="{91240B29-F687-4f45-9708-019B960494DF}">
-                <a14:hiddenLine xmlns:a14="http://schemas.microsoft.com/office/drawing/2010/main" xmlns="" w="9525">
+                <a14:hiddenLine xmlns="" xmlns:a14="http://schemas.microsoft.com/office/drawing/2010/main" w="9525">
                   <a:solidFill>
                     <a:srgbClr val="000000"/>
                   </a:solidFill>
@@ -3740,7 +3744,7 @@
             </a:ln>
             <a:extLst>
               <a:ext uri="{91240B29-F687-4f45-9708-019B960494DF}">
-                <a14:hiddenLine xmlns:a14="http://schemas.microsoft.com/office/drawing/2010/main" xmlns="" w="9525">
+                <a14:hiddenLine xmlns="" xmlns:a14="http://schemas.microsoft.com/office/drawing/2010/main" w="9525">
                   <a:solidFill>
                     <a:srgbClr val="000000"/>
                   </a:solidFill>
@@ -3830,7 +3834,7 @@
             </a:ln>
             <a:extLst>
               <a:ext uri="{91240B29-F687-4f45-9708-019B960494DF}">
-                <a14:hiddenLine xmlns:a14="http://schemas.microsoft.com/office/drawing/2010/main" xmlns="" w="9525">
+                <a14:hiddenLine xmlns="" xmlns:a14="http://schemas.microsoft.com/office/drawing/2010/main" w="9525">
                   <a:solidFill>
                     <a:srgbClr val="000000"/>
                   </a:solidFill>
@@ -3920,7 +3924,7 @@
             </a:ln>
             <a:extLst>
               <a:ext uri="{91240B29-F687-4f45-9708-019B960494DF}">
-                <a14:hiddenLine xmlns:a14="http://schemas.microsoft.com/office/drawing/2010/main" xmlns="" w="9525">
+                <a14:hiddenLine xmlns="" xmlns:a14="http://schemas.microsoft.com/office/drawing/2010/main" w="9525">
                   <a:solidFill>
                     <a:srgbClr val="000000"/>
                   </a:solidFill>
@@ -3982,7 +3986,7 @@
             </a:ln>
             <a:extLst>
               <a:ext uri="{91240B29-F687-4f45-9708-019B960494DF}">
-                <a14:hiddenLine xmlns:a14="http://schemas.microsoft.com/office/drawing/2010/main" xmlns="" w="9525">
+                <a14:hiddenLine xmlns="" xmlns:a14="http://schemas.microsoft.com/office/drawing/2010/main" w="9525">
                   <a:solidFill>
                     <a:srgbClr val="000000"/>
                   </a:solidFill>
@@ -4102,7 +4106,7 @@
             </a:ln>
             <a:extLst>
               <a:ext uri="{91240B29-F687-4f45-9708-019B960494DF}">
-                <a14:hiddenLine xmlns:a14="http://schemas.microsoft.com/office/drawing/2010/main" xmlns="" w="9525">
+                <a14:hiddenLine xmlns="" xmlns:a14="http://schemas.microsoft.com/office/drawing/2010/main" w="9525">
                   <a:solidFill>
                     <a:srgbClr val="000000"/>
                   </a:solidFill>
@@ -4170,7 +4174,7 @@
             </a:ln>
             <a:extLst>
               <a:ext uri="{91240B29-F687-4f45-9708-019B960494DF}">
-                <a14:hiddenLine xmlns:a14="http://schemas.microsoft.com/office/drawing/2010/main" xmlns="" w="9525">
+                <a14:hiddenLine xmlns="" xmlns:a14="http://schemas.microsoft.com/office/drawing/2010/main" w="9525">
                   <a:solidFill>
                     <a:srgbClr val="000000"/>
                   </a:solidFill>
@@ -4260,7 +4264,7 @@
             </a:ln>
             <a:extLst>
               <a:ext uri="{91240B29-F687-4f45-9708-019B960494DF}">
-                <a14:hiddenLine xmlns:a14="http://schemas.microsoft.com/office/drawing/2010/main" xmlns="" w="9525">
+                <a14:hiddenLine xmlns="" xmlns:a14="http://schemas.microsoft.com/office/drawing/2010/main" w="9525">
                   <a:solidFill>
                     <a:srgbClr val="000000"/>
                   </a:solidFill>
@@ -4400,7 +4404,7 @@
           <a:p>
             <a:fld id="{48A87A34-81AB-432B-8DAE-1953F412C126}" type="datetimeFigureOut">
               <a:rPr lang="en-US" dirty="0"/>
-              <a:t>12/1/2020</a:t>
+              <a:t>12/5/2020</a:t>
             </a:fld>
             <a:endParaRPr lang="en-US" dirty="0"/>
           </a:p>
@@ -4662,7 +4666,7 @@
           <a:p>
             <a:fld id="{48A87A34-81AB-432B-8DAE-1953F412C126}" type="datetimeFigureOut">
               <a:rPr lang="en-US" dirty="0"/>
-              <a:t>12/1/2020</a:t>
+              <a:t>12/5/2020</a:t>
             </a:fld>
             <a:endParaRPr lang="en-US" dirty="0"/>
           </a:p>
@@ -4853,7 +4857,7 @@
           <a:p>
             <a:fld id="{48A87A34-81AB-432B-8DAE-1953F412C126}" type="datetimeFigureOut">
               <a:rPr lang="en-US" dirty="0"/>
-              <a:t>12/1/2020</a:t>
+              <a:t>12/5/2020</a:t>
             </a:fld>
             <a:endParaRPr lang="en-US" dirty="0"/>
           </a:p>
@@ -5111,7 +5115,7 @@
           <a:p>
             <a:fld id="{48A87A34-81AB-432B-8DAE-1953F412C126}" type="datetimeFigureOut">
               <a:rPr lang="en-US" dirty="0"/>
-              <a:t>12/1/2020</a:t>
+              <a:t>12/5/2020</a:t>
             </a:fld>
             <a:endParaRPr lang="en-US" dirty="0"/>
           </a:p>
@@ -5540,7 +5544,7 @@
           <a:p>
             <a:fld id="{48A87A34-81AB-432B-8DAE-1953F412C126}" type="datetimeFigureOut">
               <a:rPr lang="en-US" dirty="0"/>
-              <a:t>12/1/2020</a:t>
+              <a:t>12/5/2020</a:t>
             </a:fld>
             <a:endParaRPr lang="en-US" dirty="0"/>
           </a:p>
@@ -6081,7 +6085,7 @@
           <a:p>
             <a:fld id="{48A87A34-81AB-432B-8DAE-1953F412C126}" type="datetimeFigureOut">
               <a:rPr lang="en-US" dirty="0"/>
-              <a:t>12/1/2020</a:t>
+              <a:t>12/5/2020</a:t>
             </a:fld>
             <a:endParaRPr lang="en-US" dirty="0"/>
           </a:p>
@@ -6796,7 +6800,7 @@
           <a:p>
             <a:fld id="{48A87A34-81AB-432B-8DAE-1953F412C126}" type="datetimeFigureOut">
               <a:rPr lang="en-US" dirty="0"/>
-              <a:t>12/1/2020</a:t>
+              <a:t>12/5/2020</a:t>
             </a:fld>
             <a:endParaRPr lang="en-US" dirty="0"/>
           </a:p>
@@ -6961,7 +6965,7 @@
           <a:p>
             <a:fld id="{48A87A34-81AB-432B-8DAE-1953F412C126}" type="datetimeFigureOut">
               <a:rPr lang="en-US" dirty="0"/>
-              <a:t>12/1/2020</a:t>
+              <a:t>12/5/2020</a:t>
             </a:fld>
             <a:endParaRPr lang="en-US" dirty="0"/>
           </a:p>
@@ -7136,7 +7140,7 @@
           <a:p>
             <a:fld id="{48A87A34-81AB-432B-8DAE-1953F412C126}" type="datetimeFigureOut">
               <a:rPr lang="en-US" dirty="0"/>
-              <a:t>12/1/2020</a:t>
+              <a:t>12/5/2020</a:t>
             </a:fld>
             <a:endParaRPr lang="en-US" dirty="0"/>
           </a:p>
@@ -7301,7 +7305,7 @@
           <a:p>
             <a:fld id="{48A87A34-81AB-432B-8DAE-1953F412C126}" type="datetimeFigureOut">
               <a:rPr lang="en-US" dirty="0"/>
-              <a:t>12/1/2020</a:t>
+              <a:t>12/5/2020</a:t>
             </a:fld>
             <a:endParaRPr lang="en-US" dirty="0"/>
           </a:p>
@@ -7546,7 +7550,7 @@
           <a:p>
             <a:fld id="{48A87A34-81AB-432B-8DAE-1953F412C126}" type="datetimeFigureOut">
               <a:rPr lang="en-US" dirty="0"/>
-              <a:t>12/1/2020</a:t>
+              <a:t>12/5/2020</a:t>
             </a:fld>
             <a:endParaRPr lang="en-US" dirty="0"/>
           </a:p>
@@ -7773,7 +7777,7 @@
           <a:p>
             <a:fld id="{48A87A34-81AB-432B-8DAE-1953F412C126}" type="datetimeFigureOut">
               <a:rPr lang="en-US" dirty="0"/>
-              <a:t>12/1/2020</a:t>
+              <a:t>12/5/2020</a:t>
             </a:fld>
             <a:endParaRPr lang="en-US" dirty="0"/>
           </a:p>
@@ -8149,7 +8153,7 @@
           <a:p>
             <a:fld id="{48A87A34-81AB-432B-8DAE-1953F412C126}" type="datetimeFigureOut">
               <a:rPr lang="en-US" dirty="0"/>
-              <a:t>12/1/2020</a:t>
+              <a:t>12/5/2020</a:t>
             </a:fld>
             <a:endParaRPr lang="en-US" dirty="0"/>
           </a:p>
@@ -8262,7 +8266,7 @@
           <a:p>
             <a:fld id="{48A87A34-81AB-432B-8DAE-1953F412C126}" type="datetimeFigureOut">
               <a:rPr lang="en-US" dirty="0"/>
-              <a:t>12/1/2020</a:t>
+              <a:t>12/5/2020</a:t>
             </a:fld>
             <a:endParaRPr lang="en-US" dirty="0"/>
           </a:p>
@@ -8352,7 +8356,7 @@
           <a:p>
             <a:fld id="{48A87A34-81AB-432B-8DAE-1953F412C126}" type="datetimeFigureOut">
               <a:rPr lang="en-US" dirty="0"/>
-              <a:t>12/1/2020</a:t>
+              <a:t>12/5/2020</a:t>
             </a:fld>
             <a:endParaRPr lang="en-US" dirty="0"/>
           </a:p>
@@ -8596,7 +8600,7 @@
           <a:p>
             <a:fld id="{48A87A34-81AB-432B-8DAE-1953F412C126}" type="datetimeFigureOut">
               <a:rPr lang="en-US" dirty="0"/>
-              <a:t>12/1/2020</a:t>
+              <a:t>12/5/2020</a:t>
             </a:fld>
             <a:endParaRPr lang="en-US" dirty="0"/>
           </a:p>
@@ -8871,7 +8875,7 @@
           <a:p>
             <a:fld id="{48A87A34-81AB-432B-8DAE-1953F412C126}" type="datetimeFigureOut">
               <a:rPr lang="en-US" dirty="0"/>
-              <a:t>12/1/2020</a:t>
+              <a:t>12/5/2020</a:t>
             </a:fld>
             <a:endParaRPr lang="en-US" dirty="0"/>
           </a:p>
@@ -8989,7 +8993,7 @@
           <a:noFill/>
           <a:extLst>
             <a:ext uri="{909E8E84-426E-40dd-AFC4-6F175D3DCCD1}">
-              <a14:hiddenFill xmlns:a14="http://schemas.microsoft.com/office/drawing/2010/main" xmlns="">
+              <a14:hiddenFill xmlns="" xmlns:a14="http://schemas.microsoft.com/office/drawing/2010/main">
                 <a:solidFill>
                   <a:srgbClr val="FFFFFF"/>
                 </a:solidFill>
@@ -9063,7 +9067,7 @@
               </a:ln>
               <a:extLst>
                 <a:ext uri="{91240B29-F687-4f45-9708-019B960494DF}">
-                  <a14:hiddenLine xmlns:a14="http://schemas.microsoft.com/office/drawing/2010/main" xmlns="" w="9525">
+                  <a14:hiddenLine xmlns="" xmlns:a14="http://schemas.microsoft.com/office/drawing/2010/main" w="9525">
                     <a:solidFill>
                       <a:srgbClr val="000000"/>
                     </a:solidFill>
@@ -9153,7 +9157,7 @@
               </a:ln>
               <a:extLst>
                 <a:ext uri="{91240B29-F687-4f45-9708-019B960494DF}">
-                  <a14:hiddenLine xmlns:a14="http://schemas.microsoft.com/office/drawing/2010/main" xmlns="" w="9525">
+                  <a14:hiddenLine xmlns="" xmlns:a14="http://schemas.microsoft.com/office/drawing/2010/main" w="9525">
                     <a:solidFill>
                       <a:srgbClr val="000000"/>
                     </a:solidFill>
@@ -9243,7 +9247,7 @@
               </a:ln>
               <a:extLst>
                 <a:ext uri="{91240B29-F687-4f45-9708-019B960494DF}">
-                  <a14:hiddenLine xmlns:a14="http://schemas.microsoft.com/office/drawing/2010/main" xmlns="" w="9525">
+                  <a14:hiddenLine xmlns="" xmlns:a14="http://schemas.microsoft.com/office/drawing/2010/main" w="9525">
                     <a:solidFill>
                       <a:srgbClr val="000000"/>
                     </a:solidFill>
@@ -9305,7 +9309,7 @@
               </a:ln>
               <a:extLst>
                 <a:ext uri="{91240B29-F687-4f45-9708-019B960494DF}">
-                  <a14:hiddenLine xmlns:a14="http://schemas.microsoft.com/office/drawing/2010/main" xmlns="" w="9525">
+                  <a14:hiddenLine xmlns="" xmlns:a14="http://schemas.microsoft.com/office/drawing/2010/main" w="9525">
                     <a:solidFill>
                       <a:srgbClr val="000000"/>
                     </a:solidFill>
@@ -9395,7 +9399,7 @@
               </a:ln>
               <a:extLst>
                 <a:ext uri="{91240B29-F687-4f45-9708-019B960494DF}">
-                  <a14:hiddenLine xmlns:a14="http://schemas.microsoft.com/office/drawing/2010/main" xmlns="" w="9525">
+                  <a14:hiddenLine xmlns="" xmlns:a14="http://schemas.microsoft.com/office/drawing/2010/main" w="9525">
                     <a:solidFill>
                       <a:srgbClr val="000000"/>
                     </a:solidFill>
@@ -9457,7 +9461,7 @@
               </a:ln>
               <a:extLst>
                 <a:ext uri="{91240B29-F687-4f45-9708-019B960494DF}">
-                  <a14:hiddenLine xmlns:a14="http://schemas.microsoft.com/office/drawing/2010/main" xmlns="" w="9525">
+                  <a14:hiddenLine xmlns="" xmlns:a14="http://schemas.microsoft.com/office/drawing/2010/main" w="9525">
                     <a:solidFill>
                       <a:srgbClr val="000000"/>
                     </a:solidFill>
@@ -9519,7 +9523,7 @@
               </a:ln>
               <a:extLst>
                 <a:ext uri="{91240B29-F687-4f45-9708-019B960494DF}">
-                  <a14:hiddenLine xmlns:a14="http://schemas.microsoft.com/office/drawing/2010/main" xmlns="" w="9525">
+                  <a14:hiddenLine xmlns="" xmlns:a14="http://schemas.microsoft.com/office/drawing/2010/main" w="9525">
                     <a:solidFill>
                       <a:srgbClr val="000000"/>
                     </a:solidFill>
@@ -9609,7 +9613,7 @@
               </a:ln>
               <a:extLst>
                 <a:ext uri="{91240B29-F687-4f45-9708-019B960494DF}">
-                  <a14:hiddenLine xmlns:a14="http://schemas.microsoft.com/office/drawing/2010/main" xmlns="" w="9525">
+                  <a14:hiddenLine xmlns="" xmlns:a14="http://schemas.microsoft.com/office/drawing/2010/main" w="9525">
                     <a:solidFill>
                       <a:srgbClr val="000000"/>
                     </a:solidFill>
@@ -9699,7 +9703,7 @@
               </a:ln>
               <a:extLst>
                 <a:ext uri="{91240B29-F687-4f45-9708-019B960494DF}">
-                  <a14:hiddenLine xmlns:a14="http://schemas.microsoft.com/office/drawing/2010/main" xmlns="" w="9525">
+                  <a14:hiddenLine xmlns="" xmlns:a14="http://schemas.microsoft.com/office/drawing/2010/main" w="9525">
                     <a:solidFill>
                       <a:srgbClr val="000000"/>
                     </a:solidFill>
@@ -9761,7 +9765,7 @@
               </a:ln>
               <a:extLst>
                 <a:ext uri="{91240B29-F687-4f45-9708-019B960494DF}">
-                  <a14:hiddenLine xmlns:a14="http://schemas.microsoft.com/office/drawing/2010/main" xmlns="" w="9525">
+                  <a14:hiddenLine xmlns="" xmlns:a14="http://schemas.microsoft.com/office/drawing/2010/main" w="9525">
                     <a:solidFill>
                       <a:srgbClr val="000000"/>
                     </a:solidFill>
@@ -9871,7 +9875,7 @@
               </a:ln>
               <a:extLst>
                 <a:ext uri="{91240B29-F687-4f45-9708-019B960494DF}">
-                  <a14:hiddenLine xmlns:a14="http://schemas.microsoft.com/office/drawing/2010/main" xmlns="" w="9525">
+                  <a14:hiddenLine xmlns="" xmlns:a14="http://schemas.microsoft.com/office/drawing/2010/main" w="9525">
                     <a:solidFill>
                       <a:srgbClr val="000000"/>
                     </a:solidFill>
@@ -9955,7 +9959,7 @@
               </a:ln>
               <a:extLst>
                 <a:ext uri="{91240B29-F687-4f45-9708-019B960494DF}">
-                  <a14:hiddenLine xmlns:a14="http://schemas.microsoft.com/office/drawing/2010/main" xmlns="" w="9525">
+                  <a14:hiddenLine xmlns="" xmlns:a14="http://schemas.microsoft.com/office/drawing/2010/main" w="9525">
                     <a:solidFill>
                       <a:srgbClr val="000000"/>
                     </a:solidFill>
@@ -10017,7 +10021,7 @@
               </a:ln>
               <a:extLst>
                 <a:ext uri="{91240B29-F687-4f45-9708-019B960494DF}">
-                  <a14:hiddenLine xmlns:a14="http://schemas.microsoft.com/office/drawing/2010/main" xmlns="" w="9525">
+                  <a14:hiddenLine xmlns="" xmlns:a14="http://schemas.microsoft.com/office/drawing/2010/main" w="9525">
                     <a:solidFill>
                       <a:srgbClr val="000000"/>
                     </a:solidFill>
@@ -10079,7 +10083,7 @@
               </a:ln>
               <a:extLst>
                 <a:ext uri="{91240B29-F687-4f45-9708-019B960494DF}">
-                  <a14:hiddenLine xmlns:a14="http://schemas.microsoft.com/office/drawing/2010/main" xmlns="" w="9525">
+                  <a14:hiddenLine xmlns="" xmlns:a14="http://schemas.microsoft.com/office/drawing/2010/main" w="9525">
                     <a:solidFill>
                       <a:srgbClr val="000000"/>
                     </a:solidFill>
@@ -10169,7 +10173,7 @@
               </a:ln>
               <a:extLst>
                 <a:ext uri="{91240B29-F687-4f45-9708-019B960494DF}">
-                  <a14:hiddenLine xmlns:a14="http://schemas.microsoft.com/office/drawing/2010/main" xmlns="" w="9525">
+                  <a14:hiddenLine xmlns="" xmlns:a14="http://schemas.microsoft.com/office/drawing/2010/main" w="9525">
                     <a:solidFill>
                       <a:srgbClr val="000000"/>
                     </a:solidFill>
@@ -10203,7 +10207,7 @@
               </a:ln>
               <a:extLst>
                 <a:ext uri="{91240B29-F687-4f45-9708-019B960494DF}">
-                  <a14:hiddenLine xmlns:a14="http://schemas.microsoft.com/office/drawing/2010/main" xmlns="" w="9525">
+                  <a14:hiddenLine xmlns="" xmlns:a14="http://schemas.microsoft.com/office/drawing/2010/main" w="9525">
                     <a:solidFill>
                       <a:srgbClr val="000000"/>
                     </a:solidFill>
@@ -10268,7 +10272,7 @@
               </a:ln>
               <a:extLst>
                 <a:ext uri="{91240B29-F687-4f45-9708-019B960494DF}">
-                  <a14:hiddenLine xmlns:a14="http://schemas.microsoft.com/office/drawing/2010/main" xmlns="" w="9525">
+                  <a14:hiddenLine xmlns="" xmlns:a14="http://schemas.microsoft.com/office/drawing/2010/main" w="9525">
                     <a:solidFill>
                       <a:srgbClr val="000000"/>
                     </a:solidFill>
@@ -10358,7 +10362,7 @@
               </a:ln>
               <a:extLst>
                 <a:ext uri="{91240B29-F687-4f45-9708-019B960494DF}">
-                  <a14:hiddenLine xmlns:a14="http://schemas.microsoft.com/office/drawing/2010/main" xmlns="" w="9525">
+                  <a14:hiddenLine xmlns="" xmlns:a14="http://schemas.microsoft.com/office/drawing/2010/main" w="9525">
                     <a:solidFill>
                       <a:srgbClr val="000000"/>
                     </a:solidFill>
@@ -10420,7 +10424,7 @@
               </a:ln>
               <a:extLst>
                 <a:ext uri="{91240B29-F687-4f45-9708-019B960494DF}">
-                  <a14:hiddenLine xmlns:a14="http://schemas.microsoft.com/office/drawing/2010/main" xmlns="" w="9525">
+                  <a14:hiddenLine xmlns="" xmlns:a14="http://schemas.microsoft.com/office/drawing/2010/main" w="9525">
                     <a:solidFill>
                       <a:srgbClr val="000000"/>
                     </a:solidFill>
@@ -10510,7 +10514,7 @@
               </a:ln>
               <a:extLst>
                 <a:ext uri="{91240B29-F687-4f45-9708-019B960494DF}">
-                  <a14:hiddenLine xmlns:a14="http://schemas.microsoft.com/office/drawing/2010/main" xmlns="" w="9525">
+                  <a14:hiddenLine xmlns="" xmlns:a14="http://schemas.microsoft.com/office/drawing/2010/main" w="9525">
                     <a:solidFill>
                       <a:srgbClr val="000000"/>
                     </a:solidFill>
@@ -10575,7 +10579,7 @@
               </a:ln>
               <a:extLst>
                 <a:ext uri="{91240B29-F687-4f45-9708-019B960494DF}">
-                  <a14:hiddenLine xmlns:a14="http://schemas.microsoft.com/office/drawing/2010/main" xmlns="" w="9525">
+                  <a14:hiddenLine xmlns="" xmlns:a14="http://schemas.microsoft.com/office/drawing/2010/main" w="9525">
                     <a:solidFill>
                       <a:srgbClr val="000000"/>
                     </a:solidFill>
@@ -10637,7 +10641,7 @@
               </a:ln>
               <a:extLst>
                 <a:ext uri="{91240B29-F687-4f45-9708-019B960494DF}">
-                  <a14:hiddenLine xmlns:a14="http://schemas.microsoft.com/office/drawing/2010/main" xmlns="" w="9525">
+                  <a14:hiddenLine xmlns="" xmlns:a14="http://schemas.microsoft.com/office/drawing/2010/main" w="9525">
                     <a:solidFill>
                       <a:srgbClr val="000000"/>
                     </a:solidFill>
@@ -10727,7 +10731,7 @@
               </a:ln>
               <a:extLst>
                 <a:ext uri="{91240B29-F687-4f45-9708-019B960494DF}">
-                  <a14:hiddenLine xmlns:a14="http://schemas.microsoft.com/office/drawing/2010/main" xmlns="" w="9525">
+                  <a14:hiddenLine xmlns="" xmlns:a14="http://schemas.microsoft.com/office/drawing/2010/main" w="9525">
                     <a:solidFill>
                       <a:srgbClr val="000000"/>
                     </a:solidFill>
@@ -10817,7 +10821,7 @@
               </a:ln>
               <a:extLst>
                 <a:ext uri="{91240B29-F687-4f45-9708-019B960494DF}">
-                  <a14:hiddenLine xmlns:a14="http://schemas.microsoft.com/office/drawing/2010/main" xmlns="" w="9525">
+                  <a14:hiddenLine xmlns="" xmlns:a14="http://schemas.microsoft.com/office/drawing/2010/main" w="9525">
                     <a:solidFill>
                       <a:srgbClr val="000000"/>
                     </a:solidFill>
@@ -10882,7 +10886,7 @@
               </a:ln>
               <a:extLst>
                 <a:ext uri="{91240B29-F687-4f45-9708-019B960494DF}">
-                  <a14:hiddenLine xmlns:a14="http://schemas.microsoft.com/office/drawing/2010/main" xmlns="" w="9525">
+                  <a14:hiddenLine xmlns="" xmlns:a14="http://schemas.microsoft.com/office/drawing/2010/main" w="9525">
                     <a:solidFill>
                       <a:srgbClr val="000000"/>
                     </a:solidFill>
@@ -11002,7 +11006,7 @@
               </a:ln>
               <a:extLst>
                 <a:ext uri="{91240B29-F687-4f45-9708-019B960494DF}">
-                  <a14:hiddenLine xmlns:a14="http://schemas.microsoft.com/office/drawing/2010/main" xmlns="" w="9525">
+                  <a14:hiddenLine xmlns="" xmlns:a14="http://schemas.microsoft.com/office/drawing/2010/main" w="9525">
                     <a:solidFill>
                       <a:srgbClr val="000000"/>
                     </a:solidFill>
@@ -11083,7 +11087,7 @@
               </a:ln>
               <a:extLst>
                 <a:ext uri="{91240B29-F687-4f45-9708-019B960494DF}">
-                  <a14:hiddenLine xmlns:a14="http://schemas.microsoft.com/office/drawing/2010/main" xmlns="" w="9525">
+                  <a14:hiddenLine xmlns="" xmlns:a14="http://schemas.microsoft.com/office/drawing/2010/main" w="9525">
                     <a:solidFill>
                       <a:srgbClr val="000000"/>
                     </a:solidFill>
@@ -11198,7 +11202,7 @@
               </a:ln>
               <a:extLst>
                 <a:ext uri="{91240B29-F687-4f45-9708-019B960494DF}">
-                  <a14:hiddenLine xmlns:a14="http://schemas.microsoft.com/office/drawing/2010/main" xmlns="" w="9525">
+                  <a14:hiddenLine xmlns="" xmlns:a14="http://schemas.microsoft.com/office/drawing/2010/main" w="9525">
                     <a:solidFill>
                       <a:srgbClr val="000000"/>
                     </a:solidFill>
@@ -11288,7 +11292,7 @@
               </a:ln>
               <a:extLst>
                 <a:ext uri="{91240B29-F687-4f45-9708-019B960494DF}">
-                  <a14:hiddenLine xmlns:a14="http://schemas.microsoft.com/office/drawing/2010/main" xmlns="" w="9525">
+                  <a14:hiddenLine xmlns="" xmlns:a14="http://schemas.microsoft.com/office/drawing/2010/main" w="9525">
                     <a:solidFill>
                       <a:srgbClr val="000000"/>
                     </a:solidFill>
@@ -11353,7 +11357,7 @@
               </a:ln>
               <a:extLst>
                 <a:ext uri="{91240B29-F687-4f45-9708-019B960494DF}">
-                  <a14:hiddenLine xmlns:a14="http://schemas.microsoft.com/office/drawing/2010/main" xmlns="" w="9525">
+                  <a14:hiddenLine xmlns="" xmlns:a14="http://schemas.microsoft.com/office/drawing/2010/main" w="9525">
                     <a:solidFill>
                       <a:srgbClr val="000000"/>
                     </a:solidFill>
@@ -11443,7 +11447,7 @@
               </a:ln>
               <a:extLst>
                 <a:ext uri="{91240B29-F687-4f45-9708-019B960494DF}">
-                  <a14:hiddenLine xmlns:a14="http://schemas.microsoft.com/office/drawing/2010/main" xmlns="" w="9525">
+                  <a14:hiddenLine xmlns="" xmlns:a14="http://schemas.microsoft.com/office/drawing/2010/main" w="9525">
                     <a:solidFill>
                       <a:srgbClr val="000000"/>
                     </a:solidFill>
@@ -11511,7 +11515,7 @@
               </a:ln>
               <a:extLst>
                 <a:ext uri="{91240B29-F687-4f45-9708-019B960494DF}">
-                  <a14:hiddenLine xmlns:a14="http://schemas.microsoft.com/office/drawing/2010/main" xmlns="" w="9525">
+                  <a14:hiddenLine xmlns="" xmlns:a14="http://schemas.microsoft.com/office/drawing/2010/main" w="9525">
                     <a:solidFill>
                       <a:srgbClr val="000000"/>
                     </a:solidFill>
@@ -11601,7 +11605,7 @@
               </a:ln>
               <a:extLst>
                 <a:ext uri="{91240B29-F687-4f45-9708-019B960494DF}">
-                  <a14:hiddenLine xmlns:a14="http://schemas.microsoft.com/office/drawing/2010/main" xmlns="" w="9525">
+                  <a14:hiddenLine xmlns="" xmlns:a14="http://schemas.microsoft.com/office/drawing/2010/main" w="9525">
                     <a:solidFill>
                       <a:srgbClr val="000000"/>
                     </a:solidFill>
@@ -11669,7 +11673,7 @@
               </a:ln>
               <a:extLst>
                 <a:ext uri="{91240B29-F687-4f45-9708-019B960494DF}">
-                  <a14:hiddenLine xmlns:a14="http://schemas.microsoft.com/office/drawing/2010/main" xmlns="" w="9525">
+                  <a14:hiddenLine xmlns="" xmlns:a14="http://schemas.microsoft.com/office/drawing/2010/main" w="9525">
                     <a:solidFill>
                       <a:srgbClr val="000000"/>
                     </a:solidFill>
@@ -11759,7 +11763,7 @@
               </a:ln>
               <a:extLst>
                 <a:ext uri="{91240B29-F687-4f45-9708-019B960494DF}">
-                  <a14:hiddenLine xmlns:a14="http://schemas.microsoft.com/office/drawing/2010/main" xmlns="" w="9525">
+                  <a14:hiddenLine xmlns="" xmlns:a14="http://schemas.microsoft.com/office/drawing/2010/main" w="9525">
                     <a:solidFill>
                       <a:srgbClr val="000000"/>
                     </a:solidFill>
@@ -11793,7 +11797,7 @@
               </a:ln>
               <a:extLst>
                 <a:ext uri="{91240B29-F687-4f45-9708-019B960494DF}">
-                  <a14:hiddenLine xmlns:a14="http://schemas.microsoft.com/office/drawing/2010/main" xmlns="" w="9525">
+                  <a14:hiddenLine xmlns="" xmlns:a14="http://schemas.microsoft.com/office/drawing/2010/main" w="9525">
                     <a:solidFill>
                       <a:srgbClr val="000000"/>
                     </a:solidFill>
@@ -11934,7 +11938,7 @@
             <a:fld id="{48A87A34-81AB-432B-8DAE-1953F412C126}" type="datetimeFigureOut">
               <a:rPr lang="en-US" dirty="0"/>
               <a:pPr/>
-              <a:t>12/1/2020</a:t>
+              <a:t>12/5/2020</a:t>
             </a:fld>
             <a:endParaRPr lang="en-US" dirty="0"/>
           </a:p>
@@ -12485,7 +12489,7 @@
           <p:cNvPr id="2" name="Title 1">
             <a:extLst>
               <a:ext uri="{FF2B5EF4-FFF2-40B4-BE49-F238E27FC236}">
-                <a16:creationId xmlns:a16="http://schemas.microsoft.com/office/drawing/2014/main" id="{29E57FC8-B5B0-4E71-912F-C81B10144C74}"/>
+                <a16:creationId xmlns:a16="http://schemas.microsoft.com/office/drawing/2014/main" id="{1DC8339E-7ECD-45CD-959C-3DCDBA8C0F91}"/>
               </a:ext>
             </a:extLst>
           </p:cNvPr>
@@ -12504,45 +12508,45 @@
             <a:pPr algn="ctr"/>
             <a:r>
               <a:rPr lang="en-US" dirty="0"/>
-              <a:t>The design</a:t>
+              <a:t>The application</a:t>
             </a:r>
             <a:endParaRPr lang="en-CA" dirty="0"/>
           </a:p>
         </p:txBody>
       </p:sp>
-      <p:pic>
-        <p:nvPicPr>
-          <p:cNvPr id="5" name="Content Placeholder 4">
+      <p:sp>
+        <p:nvSpPr>
+          <p:cNvPr id="3" name="Content Placeholder 2">
             <a:extLst>
               <a:ext uri="{FF2B5EF4-FFF2-40B4-BE49-F238E27FC236}">
-                <a16:creationId xmlns:a16="http://schemas.microsoft.com/office/drawing/2014/main" id="{95F26E6C-E6EA-4ECB-B26F-7CA5009C5B61}"/>
+                <a16:creationId xmlns:a16="http://schemas.microsoft.com/office/drawing/2014/main" id="{0454224A-E485-4970-B24A-E7BCB01D8BCE}"/>
               </a:ext>
             </a:extLst>
           </p:cNvPr>
-          <p:cNvPicPr>
-            <a:picLocks noGrp="1" noChangeAspect="1"/>
-          </p:cNvPicPr>
+          <p:cNvSpPr>
+            <a:spLocks noGrp="1"/>
+          </p:cNvSpPr>
           <p:nvPr>
             <p:ph idx="1"/>
           </p:nvPr>
-        </p:nvPicPr>
-        <p:blipFill>
-          <a:blip r:embed="rId2"/>
-          <a:stretch>
-            <a:fillRect/>
-          </a:stretch>
-        </p:blipFill>
-        <p:spPr>
-          <a:xfrm>
-            <a:off x="2540164" y="2249488"/>
-            <a:ext cx="7108498" cy="3541712"/>
-          </a:xfrm>
-        </p:spPr>
-      </p:pic>
+        </p:nvSpPr>
+        <p:spPr/>
+        <p:txBody>
+          <a:bodyPr/>
+          <a:lstStyle/>
+          <a:p>
+            <a:r>
+              <a:rPr lang="en-US" dirty="0"/>
+              <a:t>Let’s see the application in action!</a:t>
+            </a:r>
+            <a:endParaRPr lang="en-CA" dirty="0"/>
+          </a:p>
+        </p:txBody>
+      </p:sp>
     </p:spTree>
     <p:extLst>
       <p:ext uri="{BB962C8B-B14F-4D97-AF65-F5344CB8AC3E}">
-        <p14:creationId xmlns:p14="http://schemas.microsoft.com/office/powerpoint/2010/main" val="779684942"/>
+        <p14:creationId xmlns:p14="http://schemas.microsoft.com/office/powerpoint/2010/main" val="2417342333"/>
       </p:ext>
     </p:extLst>
   </p:cSld>
@@ -12574,7 +12578,7 @@
           <p:cNvPr id="2" name="Title 1">
             <a:extLst>
               <a:ext uri="{FF2B5EF4-FFF2-40B4-BE49-F238E27FC236}">
-                <a16:creationId xmlns:a16="http://schemas.microsoft.com/office/drawing/2014/main" id="{E4E81550-3172-41B0-84A8-824F1E68AB79}"/>
+                <a16:creationId xmlns:a16="http://schemas.microsoft.com/office/drawing/2014/main" id="{A0CAE223-FC08-4EA6-B122-959520F1D98B}"/>
               </a:ext>
             </a:extLst>
           </p:cNvPr>
@@ -12593,7 +12597,7 @@
             <a:pPr algn="ctr"/>
             <a:r>
               <a:rPr lang="en-US" dirty="0"/>
-              <a:t>The design</a:t>
+              <a:t>Any Questions?</a:t>
             </a:r>
             <a:endParaRPr lang="en-CA" dirty="0"/>
           </a:p>
@@ -12604,7 +12608,7 @@
           <p:cNvPr id="3" name="Content Placeholder 2">
             <a:extLst>
               <a:ext uri="{FF2B5EF4-FFF2-40B4-BE49-F238E27FC236}">
-                <a16:creationId xmlns:a16="http://schemas.microsoft.com/office/drawing/2014/main" id="{F4DA3B5D-BBD5-4844-A587-0C850C32C069}"/>
+                <a16:creationId xmlns:a16="http://schemas.microsoft.com/office/drawing/2014/main" id="{C1436446-2CCA-4308-9A06-DEE665B68998}"/>
               </a:ext>
             </a:extLst>
           </p:cNvPr>
@@ -12620,187 +12624,14 @@
           <a:bodyPr/>
           <a:lstStyle/>
           <a:p>
-            <a:endParaRPr lang="en-US" dirty="0"/>
-          </a:p>
-          <a:p>
             <a:endParaRPr lang="en-CA" dirty="0"/>
-          </a:p>
-        </p:txBody>
-      </p:sp>
-      <p:pic>
-        <p:nvPicPr>
-          <p:cNvPr id="5" name="Picture 4">
-            <a:extLst>
-              <a:ext uri="{FF2B5EF4-FFF2-40B4-BE49-F238E27FC236}">
-                <a16:creationId xmlns:a16="http://schemas.microsoft.com/office/drawing/2014/main" id="{A24471D7-E39D-4E9E-A769-F86FB22DAAE0}"/>
-              </a:ext>
-            </a:extLst>
-          </p:cNvPr>
-          <p:cNvPicPr>
-            <a:picLocks noChangeAspect="1"/>
-          </p:cNvPicPr>
-          <p:nvPr/>
-        </p:nvPicPr>
-        <p:blipFill>
-          <a:blip r:embed="rId2"/>
-          <a:stretch>
-            <a:fillRect/>
-          </a:stretch>
-        </p:blipFill>
-        <p:spPr>
-          <a:xfrm>
-            <a:off x="1268618" y="2218387"/>
-            <a:ext cx="2080115" cy="3580019"/>
-          </a:xfrm>
-          <a:prstGeom prst="rect">
-            <a:avLst/>
-          </a:prstGeom>
-        </p:spPr>
-      </p:pic>
-      <p:pic>
-        <p:nvPicPr>
-          <p:cNvPr id="6" name="Picture 5">
-            <a:extLst>
-              <a:ext uri="{FF2B5EF4-FFF2-40B4-BE49-F238E27FC236}">
-                <a16:creationId xmlns:a16="http://schemas.microsoft.com/office/drawing/2014/main" id="{ABAA2B84-8F69-4F9E-9821-9CDCD4C1F877}"/>
-              </a:ext>
-            </a:extLst>
-          </p:cNvPr>
-          <p:cNvPicPr>
-            <a:picLocks noChangeAspect="1"/>
-          </p:cNvPicPr>
-          <p:nvPr/>
-        </p:nvPicPr>
-        <p:blipFill>
-          <a:blip r:embed="rId3"/>
-          <a:stretch>
-            <a:fillRect/>
-          </a:stretch>
-        </p:blipFill>
-        <p:spPr>
-          <a:xfrm>
-            <a:off x="3498764" y="2237541"/>
-            <a:ext cx="2021877" cy="3580020"/>
-          </a:xfrm>
-          <a:prstGeom prst="rect">
-            <a:avLst/>
-          </a:prstGeom>
-        </p:spPr>
-      </p:pic>
-      <p:pic>
-        <p:nvPicPr>
-          <p:cNvPr id="8" name="Picture 7">
-            <a:extLst>
-              <a:ext uri="{FF2B5EF4-FFF2-40B4-BE49-F238E27FC236}">
-                <a16:creationId xmlns:a16="http://schemas.microsoft.com/office/drawing/2014/main" id="{A856B83B-BABD-4F53-95A8-7C95BC3BB009}"/>
-              </a:ext>
-            </a:extLst>
-          </p:cNvPr>
-          <p:cNvPicPr>
-            <a:picLocks noChangeAspect="1"/>
-          </p:cNvPicPr>
-          <p:nvPr/>
-        </p:nvPicPr>
-        <p:blipFill>
-          <a:blip r:embed="rId4"/>
-          <a:stretch>
-            <a:fillRect/>
-          </a:stretch>
-        </p:blipFill>
-        <p:spPr>
-          <a:xfrm>
-            <a:off x="6127552" y="2252617"/>
-            <a:ext cx="4627572" cy="3452802"/>
-          </a:xfrm>
-          <a:prstGeom prst="rect">
-            <a:avLst/>
-          </a:prstGeom>
-        </p:spPr>
-      </p:pic>
-    </p:spTree>
-    <p:extLst>
-      <p:ext uri="{BB962C8B-B14F-4D97-AF65-F5344CB8AC3E}">
-        <p14:creationId xmlns:p14="http://schemas.microsoft.com/office/powerpoint/2010/main" val="3803195589"/>
-      </p:ext>
-    </p:extLst>
-  </p:cSld>
-  <p:clrMapOvr>
-    <a:masterClrMapping/>
-  </p:clrMapOvr>
-</p:sld>
-</file>
-
-<file path=ppt/slides/slide12.xml><?xml version="1.0" encoding="utf-8"?>
-<p:sld xmlns:a="http://schemas.openxmlformats.org/drawingml/2006/main" xmlns:r="http://schemas.openxmlformats.org/officeDocument/2006/relationships" xmlns:p="http://schemas.openxmlformats.org/presentationml/2006/main">
-  <p:cSld>
-    <p:spTree>
-      <p:nvGrpSpPr>
-        <p:cNvPr id="1" name=""/>
-        <p:cNvGrpSpPr/>
-        <p:nvPr/>
-      </p:nvGrpSpPr>
-      <p:grpSpPr>
-        <a:xfrm>
-          <a:off x="0" y="0"/>
-          <a:ext cx="0" cy="0"/>
-          <a:chOff x="0" y="0"/>
-          <a:chExt cx="0" cy="0"/>
-        </a:xfrm>
-      </p:grpSpPr>
-      <p:sp>
-        <p:nvSpPr>
-          <p:cNvPr id="2" name="Title 1">
-            <a:extLst>
-              <a:ext uri="{FF2B5EF4-FFF2-40B4-BE49-F238E27FC236}">
-                <a16:creationId xmlns:a16="http://schemas.microsoft.com/office/drawing/2014/main" id="{1DC8339E-7ECD-45CD-959C-3DCDBA8C0F91}"/>
-              </a:ext>
-            </a:extLst>
-          </p:cNvPr>
-          <p:cNvSpPr>
-            <a:spLocks noGrp="1"/>
-          </p:cNvSpPr>
-          <p:nvPr>
-            <p:ph type="title"/>
-          </p:nvPr>
-        </p:nvSpPr>
-        <p:spPr/>
-        <p:txBody>
-          <a:bodyPr/>
-          <a:lstStyle/>
-          <a:p>
-            <a:endParaRPr lang="en-CA" dirty="0"/>
-          </a:p>
-        </p:txBody>
-      </p:sp>
-      <p:sp>
-        <p:nvSpPr>
-          <p:cNvPr id="3" name="Content Placeholder 2">
-            <a:extLst>
-              <a:ext uri="{FF2B5EF4-FFF2-40B4-BE49-F238E27FC236}">
-                <a16:creationId xmlns:a16="http://schemas.microsoft.com/office/drawing/2014/main" id="{0454224A-E485-4970-B24A-E7BCB01D8BCE}"/>
-              </a:ext>
-            </a:extLst>
-          </p:cNvPr>
-          <p:cNvSpPr>
-            <a:spLocks noGrp="1"/>
-          </p:cNvSpPr>
-          <p:nvPr>
-            <p:ph idx="1"/>
-          </p:nvPr>
-        </p:nvSpPr>
-        <p:spPr/>
-        <p:txBody>
-          <a:bodyPr/>
-          <a:lstStyle/>
-          <a:p>
-            <a:endParaRPr lang="en-CA"/>
           </a:p>
         </p:txBody>
       </p:sp>
     </p:spTree>
     <p:extLst>
       <p:ext uri="{BB962C8B-B14F-4D97-AF65-F5344CB8AC3E}">
-        <p14:creationId xmlns:p14="http://schemas.microsoft.com/office/powerpoint/2010/main" val="2417342333"/>
+        <p14:creationId xmlns:p14="http://schemas.microsoft.com/office/powerpoint/2010/main" val="916540522"/>
       </p:ext>
     </p:extLst>
   </p:cSld>
@@ -13106,7 +12937,7 @@
           <a:p>
             <a:r>
               <a:rPr lang="en-US" dirty="0"/>
-              <a:t>You can filter by date, and see expenses for the last month, two months, or three months.</a:t>
+              <a:t>You can filter by date, and see expenses for the last month, three months, or the last six months.</a:t>
             </a:r>
           </a:p>
           <a:p>
@@ -13466,7 +13297,12 @@
             <p:ph type="title"/>
           </p:nvPr>
         </p:nvSpPr>
-        <p:spPr/>
+        <p:spPr>
+          <a:xfrm>
+            <a:off x="1141413" y="-73940"/>
+            <a:ext cx="9905998" cy="1478570"/>
+          </a:xfrm>
+        </p:spPr>
         <p:txBody>
           <a:bodyPr/>
           <a:lstStyle/>
@@ -13480,21 +13316,47 @@
           </a:p>
         </p:txBody>
       </p:sp>
+      <p:sp>
+        <p:nvSpPr>
+          <p:cNvPr id="7" name="Content Placeholder 6">
+            <a:extLst>
+              <a:ext uri="{FF2B5EF4-FFF2-40B4-BE49-F238E27FC236}">
+                <a16:creationId xmlns:a16="http://schemas.microsoft.com/office/drawing/2014/main" id="{9B0DC44B-9F4D-45BD-BEEA-2ACE5B96463A}"/>
+              </a:ext>
+            </a:extLst>
+          </p:cNvPr>
+          <p:cNvSpPr>
+            <a:spLocks noGrp="1"/>
+          </p:cNvSpPr>
+          <p:nvPr>
+            <p:ph idx="1"/>
+          </p:nvPr>
+        </p:nvSpPr>
+        <p:spPr/>
+        <p:txBody>
+          <a:bodyPr/>
+          <a:lstStyle/>
+          <a:p>
+            <a:endParaRPr lang="en-US" dirty="0"/>
+          </a:p>
+          <a:p>
+            <a:endParaRPr lang="en-CA" dirty="0"/>
+          </a:p>
+        </p:txBody>
+      </p:sp>
       <p:pic>
         <p:nvPicPr>
-          <p:cNvPr id="5" name="Content Placeholder 4">
+          <p:cNvPr id="9" name="Picture 8">
             <a:extLst>
               <a:ext uri="{FF2B5EF4-FFF2-40B4-BE49-F238E27FC236}">
-                <a16:creationId xmlns:a16="http://schemas.microsoft.com/office/drawing/2014/main" id="{04A8284E-7D49-42CA-8AB7-BE922C81ECB7}"/>
+                <a16:creationId xmlns:a16="http://schemas.microsoft.com/office/drawing/2014/main" id="{CC399FFC-CD78-498E-AB1D-7746C9E38473}"/>
               </a:ext>
             </a:extLst>
           </p:cNvPr>
           <p:cNvPicPr>
-            <a:picLocks noGrp="1" noChangeAspect="1"/>
+            <a:picLocks noChangeAspect="1"/>
           </p:cNvPicPr>
-          <p:nvPr>
-            <p:ph idx="1"/>
-          </p:nvPr>
+          <p:nvPr/>
         </p:nvPicPr>
         <p:blipFill>
           <a:blip r:embed="rId2"/>
@@ -13504,9 +13366,12 @@
         </p:blipFill>
         <p:spPr>
           <a:xfrm>
-            <a:off x="2923081" y="1659442"/>
-            <a:ext cx="6167653" cy="5198558"/>
+            <a:off x="2295512" y="1035815"/>
+            <a:ext cx="7597798" cy="5822185"/>
           </a:xfrm>
+          <a:prstGeom prst="rect">
+            <a:avLst/>
+          </a:prstGeom>
         </p:spPr>
       </p:pic>
     </p:spTree>
@@ -13569,21 +13434,44 @@
           </a:p>
         </p:txBody>
       </p:sp>
+      <p:sp>
+        <p:nvSpPr>
+          <p:cNvPr id="4" name="Content Placeholder 3">
+            <a:extLst>
+              <a:ext uri="{FF2B5EF4-FFF2-40B4-BE49-F238E27FC236}">
+                <a16:creationId xmlns:a16="http://schemas.microsoft.com/office/drawing/2014/main" id="{47A0E667-93B2-43FE-B118-484E5419EB81}"/>
+              </a:ext>
+            </a:extLst>
+          </p:cNvPr>
+          <p:cNvSpPr>
+            <a:spLocks noGrp="1"/>
+          </p:cNvSpPr>
+          <p:nvPr>
+            <p:ph idx="1"/>
+          </p:nvPr>
+        </p:nvSpPr>
+        <p:spPr/>
+        <p:txBody>
+          <a:bodyPr/>
+          <a:lstStyle/>
+          <a:p>
+            <a:endParaRPr lang="en-CA"/>
+          </a:p>
+        </p:txBody>
+      </p:sp>
       <p:pic>
         <p:nvPicPr>
-          <p:cNvPr id="5" name="Content Placeholder 4">
+          <p:cNvPr id="7" name="Picture 6">
             <a:extLst>
               <a:ext uri="{FF2B5EF4-FFF2-40B4-BE49-F238E27FC236}">
-                <a16:creationId xmlns:a16="http://schemas.microsoft.com/office/drawing/2014/main" id="{5B02F891-7F2D-4B61-AE06-74450B64942B}"/>
+                <a16:creationId xmlns:a16="http://schemas.microsoft.com/office/drawing/2014/main" id="{0B1ADCF0-0BFD-459E-BFE9-F769931E1BBA}"/>
               </a:ext>
             </a:extLst>
           </p:cNvPr>
           <p:cNvPicPr>
-            <a:picLocks noGrp="1" noChangeAspect="1"/>
+            <a:picLocks noChangeAspect="1"/>
           </p:cNvPicPr>
-          <p:nvPr>
-            <p:ph idx="1"/>
-          </p:nvPr>
+          <p:nvPr/>
         </p:nvPicPr>
         <p:blipFill>
           <a:blip r:embed="rId2"/>
@@ -13593,9 +13481,12 @@
         </p:blipFill>
         <p:spPr>
           <a:xfrm>
-            <a:off x="0" y="2082285"/>
-            <a:ext cx="12192000" cy="4775716"/>
+            <a:off x="0" y="1844923"/>
+            <a:ext cx="12192000" cy="4704967"/>
           </a:xfrm>
+          <a:prstGeom prst="rect">
+            <a:avLst/>
+          </a:prstGeom>
         </p:spPr>
       </p:pic>
     </p:spTree>
@@ -13646,7 +13537,9 @@
         </p:nvSpPr>
         <p:spPr/>
         <p:txBody>
-          <a:bodyPr/>
+          <a:bodyPr>
+            <a:normAutofit fontScale="90000"/>
+          </a:bodyPr>
           <a:lstStyle/>
           <a:p>
             <a:pPr algn="ctr"/>
@@ -13654,6 +13547,23 @@
               <a:rPr lang="en-US" dirty="0"/>
               <a:t>The design</a:t>
             </a:r>
+            <a:br>
+              <a:rPr lang="en-US" dirty="0"/>
+            </a:br>
+            <a:r>
+              <a:rPr lang="en-CA" sz="2000" b="0" i="0" dirty="0">
+                <a:solidFill>
+                  <a:srgbClr val="172B4D"/>
+                </a:solidFill>
+                <a:effectLst/>
+                <a:latin typeface="-apple-system"/>
+                <a:hlinkClick r:id="rId2"/>
+              </a:rPr>
+              <a:t>https://www.figma.com/file/6il3fCmu5tSvtvRl3hgCAY/Banking-Application?node-id=0%3A1</a:t>
+            </a:r>
+            <a:br>
+              <a:rPr lang="en-CA" dirty="0"/>
+            </a:br>
             <a:endParaRPr lang="en-CA" dirty="0"/>
           </a:p>
         </p:txBody>
@@ -13675,14 +13585,14 @@
           </p:nvPr>
         </p:nvPicPr>
         <p:blipFill>
-          <a:blip r:embed="rId2"/>
+          <a:blip r:embed="rId3"/>
           <a:stretch>
             <a:fillRect/>
           </a:stretch>
         </p:blipFill>
         <p:spPr>
           <a:xfrm>
-            <a:off x="298034" y="2709908"/>
+            <a:off x="333545" y="1671221"/>
             <a:ext cx="1406950" cy="2342319"/>
           </a:xfrm>
         </p:spPr>
@@ -13702,14 +13612,14 @@
           <p:nvPr/>
         </p:nvPicPr>
         <p:blipFill>
-          <a:blip r:embed="rId3"/>
+          <a:blip r:embed="rId4"/>
           <a:stretch>
             <a:fillRect/>
           </a:stretch>
         </p:blipFill>
         <p:spPr>
           <a:xfrm>
-            <a:off x="1873117" y="2709909"/>
+            <a:off x="1908628" y="1671222"/>
             <a:ext cx="3213787" cy="2342318"/>
           </a:xfrm>
           <a:prstGeom prst="rect">
@@ -13732,14 +13642,14 @@
           <p:nvPr/>
         </p:nvPicPr>
         <p:blipFill>
-          <a:blip r:embed="rId4"/>
+          <a:blip r:embed="rId5"/>
           <a:stretch>
             <a:fillRect/>
           </a:stretch>
         </p:blipFill>
         <p:spPr>
           <a:xfrm>
-            <a:off x="8548654" y="2680533"/>
+            <a:off x="8584165" y="1641846"/>
             <a:ext cx="3213788" cy="2371694"/>
           </a:xfrm>
           <a:prstGeom prst="rect">
@@ -13762,15 +13672,135 @@
           <p:nvPr/>
         </p:nvPicPr>
         <p:blipFill>
-          <a:blip r:embed="rId5"/>
+          <a:blip r:embed="rId6"/>
           <a:stretch>
             <a:fillRect/>
           </a:stretch>
         </p:blipFill>
         <p:spPr>
           <a:xfrm>
-            <a:off x="6917520" y="2580558"/>
+            <a:off x="6953031" y="1541871"/>
             <a:ext cx="1406950" cy="2471669"/>
+          </a:xfrm>
+          <a:prstGeom prst="rect">
+            <a:avLst/>
+          </a:prstGeom>
+        </p:spPr>
+      </p:pic>
+      <p:pic>
+        <p:nvPicPr>
+          <p:cNvPr id="7" name="Content Placeholder 4">
+            <a:extLst>
+              <a:ext uri="{FF2B5EF4-FFF2-40B4-BE49-F238E27FC236}">
+                <a16:creationId xmlns:a16="http://schemas.microsoft.com/office/drawing/2014/main" id="{1B2A787C-AC16-4ED9-A8A9-AB8795D7D0CB}"/>
+              </a:ext>
+            </a:extLst>
+          </p:cNvPr>
+          <p:cNvPicPr>
+            <a:picLocks noChangeAspect="1"/>
+          </p:cNvPicPr>
+          <p:nvPr/>
+        </p:nvPicPr>
+        <p:blipFill>
+          <a:blip r:embed="rId7"/>
+          <a:stretch>
+            <a:fillRect/>
+          </a:stretch>
+        </p:blipFill>
+        <p:spPr>
+          <a:xfrm>
+            <a:off x="72172" y="4314548"/>
+            <a:ext cx="5104911" cy="2543452"/>
+          </a:xfrm>
+          <a:prstGeom prst="rect">
+            <a:avLst/>
+          </a:prstGeom>
+        </p:spPr>
+      </p:pic>
+      <p:pic>
+        <p:nvPicPr>
+          <p:cNvPr id="8" name="Picture 7">
+            <a:extLst>
+              <a:ext uri="{FF2B5EF4-FFF2-40B4-BE49-F238E27FC236}">
+                <a16:creationId xmlns:a16="http://schemas.microsoft.com/office/drawing/2014/main" id="{F5C8E0D4-0613-4517-B230-CD3CF92D56D0}"/>
+              </a:ext>
+            </a:extLst>
+          </p:cNvPr>
+          <p:cNvPicPr>
+            <a:picLocks noChangeAspect="1"/>
+          </p:cNvPicPr>
+          <p:nvPr/>
+        </p:nvPicPr>
+        <p:blipFill>
+          <a:blip r:embed="rId8"/>
+          <a:stretch>
+            <a:fillRect/>
+          </a:stretch>
+        </p:blipFill>
+        <p:spPr>
+          <a:xfrm>
+            <a:off x="7053076" y="4075922"/>
+            <a:ext cx="1593627" cy="2742741"/>
+          </a:xfrm>
+          <a:prstGeom prst="rect">
+            <a:avLst/>
+          </a:prstGeom>
+        </p:spPr>
+      </p:pic>
+      <p:pic>
+        <p:nvPicPr>
+          <p:cNvPr id="9" name="Picture 8">
+            <a:extLst>
+              <a:ext uri="{FF2B5EF4-FFF2-40B4-BE49-F238E27FC236}">
+                <a16:creationId xmlns:a16="http://schemas.microsoft.com/office/drawing/2014/main" id="{4BB95287-61EA-4F0D-83BC-30DD7D2F39D6}"/>
+              </a:ext>
+            </a:extLst>
+          </p:cNvPr>
+          <p:cNvPicPr>
+            <a:picLocks noChangeAspect="1"/>
+          </p:cNvPicPr>
+          <p:nvPr/>
+        </p:nvPicPr>
+        <p:blipFill>
+          <a:blip r:embed="rId9"/>
+          <a:stretch>
+            <a:fillRect/>
+          </a:stretch>
+        </p:blipFill>
+        <p:spPr>
+          <a:xfrm>
+            <a:off x="5526375" y="4075921"/>
+            <a:ext cx="1549010" cy="2742742"/>
+          </a:xfrm>
+          <a:prstGeom prst="rect">
+            <a:avLst/>
+          </a:prstGeom>
+        </p:spPr>
+      </p:pic>
+      <p:pic>
+        <p:nvPicPr>
+          <p:cNvPr id="10" name="Picture 9">
+            <a:extLst>
+              <a:ext uri="{FF2B5EF4-FFF2-40B4-BE49-F238E27FC236}">
+                <a16:creationId xmlns:a16="http://schemas.microsoft.com/office/drawing/2014/main" id="{E0F70A4E-33EC-41C6-B794-B91C77797101}"/>
+              </a:ext>
+            </a:extLst>
+          </p:cNvPr>
+          <p:cNvPicPr>
+            <a:picLocks noChangeAspect="1"/>
+          </p:cNvPicPr>
+          <p:nvPr/>
+        </p:nvPicPr>
+        <p:blipFill>
+          <a:blip r:embed="rId10"/>
+          <a:stretch>
+            <a:fillRect/>
+          </a:stretch>
+        </p:blipFill>
+        <p:spPr>
+          <a:xfrm>
+            <a:off x="8646703" y="4142290"/>
+            <a:ext cx="3545297" cy="2645277"/>
           </a:xfrm>
           <a:prstGeom prst="rect">
             <a:avLst/>

</xml_diff>